<commit_message>
added anti cheater slide to instructions
</commit_message>
<xml_diff>
--- a/src/SE_ELAN/Stimuli/Instructions.pptx
+++ b/src/SE_ELAN/Stimuli/Instructions.pptx
@@ -230,7 +230,7 @@
           <a:p>
             <a:fld id="{457B588A-FAB3-4C3F-A999-7E77BA0B8118}" type="datetimeFigureOut">
               <a:rPr lang="en-GB" smtClean="0"/>
-              <a:t>20/10/2021</a:t>
+              <a:t>21/10/2021</a:t>
             </a:fld>
             <a:endParaRPr lang="en-GB"/>
           </a:p>
@@ -296,7 +296,7 @@
           <a:p>
             <a:fld id="{756993CC-A683-496E-881E-006544134775}" type="slidenum">
               <a:rPr lang="en-GB" smtClean="0"/>
-              <a:t>‹N°›</a:t>
+              <a:t>‹#›</a:t>
             </a:fld>
             <a:endParaRPr lang="en-GB"/>
           </a:p>
@@ -444,7 +444,7 @@
           <a:p>
             <a:fld id="{1C2A38D2-D57A-4E64-B95F-0826012D069A}" type="datetimeFigureOut">
               <a:rPr lang="en-GB" smtClean="0"/>
-              <a:t>20/10/2021</a:t>
+              <a:t>21/10/2021</a:t>
             </a:fld>
             <a:endParaRPr lang="en-GB" dirty="0"/>
           </a:p>
@@ -486,7 +486,7 @@
           <a:p>
             <a:fld id="{9D7F7A4F-C86B-4E97-8396-79EF10BBD040}" type="slidenum">
               <a:rPr lang="en-GB" smtClean="0"/>
-              <a:t>‹N°›</a:t>
+              <a:t>‹#›</a:t>
             </a:fld>
             <a:endParaRPr lang="en-GB" dirty="0"/>
           </a:p>
@@ -614,7 +614,7 @@
           <a:p>
             <a:fld id="{1C2A38D2-D57A-4E64-B95F-0826012D069A}" type="datetimeFigureOut">
               <a:rPr lang="en-GB" smtClean="0"/>
-              <a:t>20/10/2021</a:t>
+              <a:t>21/10/2021</a:t>
             </a:fld>
             <a:endParaRPr lang="en-GB" dirty="0"/>
           </a:p>
@@ -656,7 +656,7 @@
           <a:p>
             <a:fld id="{9D7F7A4F-C86B-4E97-8396-79EF10BBD040}" type="slidenum">
               <a:rPr lang="en-GB" smtClean="0"/>
-              <a:t>‹N°›</a:t>
+              <a:t>‹#›</a:t>
             </a:fld>
             <a:endParaRPr lang="en-GB" dirty="0"/>
           </a:p>
@@ -794,7 +794,7 @@
           <a:p>
             <a:fld id="{1C2A38D2-D57A-4E64-B95F-0826012D069A}" type="datetimeFigureOut">
               <a:rPr lang="en-GB" smtClean="0"/>
-              <a:t>20/10/2021</a:t>
+              <a:t>21/10/2021</a:t>
             </a:fld>
             <a:endParaRPr lang="en-GB" dirty="0"/>
           </a:p>
@@ -836,7 +836,7 @@
           <a:p>
             <a:fld id="{9D7F7A4F-C86B-4E97-8396-79EF10BBD040}" type="slidenum">
               <a:rPr lang="en-GB" smtClean="0"/>
-              <a:t>‹N°›</a:t>
+              <a:t>‹#›</a:t>
             </a:fld>
             <a:endParaRPr lang="en-GB" dirty="0"/>
           </a:p>
@@ -964,7 +964,7 @@
           <a:p>
             <a:fld id="{1C2A38D2-D57A-4E64-B95F-0826012D069A}" type="datetimeFigureOut">
               <a:rPr lang="en-GB" smtClean="0"/>
-              <a:t>20/10/2021</a:t>
+              <a:t>21/10/2021</a:t>
             </a:fld>
             <a:endParaRPr lang="en-GB" dirty="0"/>
           </a:p>
@@ -1006,7 +1006,7 @@
           <a:p>
             <a:fld id="{9D7F7A4F-C86B-4E97-8396-79EF10BBD040}" type="slidenum">
               <a:rPr lang="en-GB" smtClean="0"/>
-              <a:t>‹N°›</a:t>
+              <a:t>‹#›</a:t>
             </a:fld>
             <a:endParaRPr lang="en-GB" dirty="0"/>
           </a:p>
@@ -1210,7 +1210,7 @@
           <a:p>
             <a:fld id="{1C2A38D2-D57A-4E64-B95F-0826012D069A}" type="datetimeFigureOut">
               <a:rPr lang="en-GB" smtClean="0"/>
-              <a:t>20/10/2021</a:t>
+              <a:t>21/10/2021</a:t>
             </a:fld>
             <a:endParaRPr lang="en-GB" dirty="0"/>
           </a:p>
@@ -1252,7 +1252,7 @@
           <a:p>
             <a:fld id="{9D7F7A4F-C86B-4E97-8396-79EF10BBD040}" type="slidenum">
               <a:rPr lang="en-GB" smtClean="0"/>
-              <a:t>‹N°›</a:t>
+              <a:t>‹#›</a:t>
             </a:fld>
             <a:endParaRPr lang="en-GB" dirty="0"/>
           </a:p>
@@ -1442,7 +1442,7 @@
           <a:p>
             <a:fld id="{1C2A38D2-D57A-4E64-B95F-0826012D069A}" type="datetimeFigureOut">
               <a:rPr lang="en-GB" smtClean="0"/>
-              <a:t>20/10/2021</a:t>
+              <a:t>21/10/2021</a:t>
             </a:fld>
             <a:endParaRPr lang="en-GB" dirty="0"/>
           </a:p>
@@ -1484,7 +1484,7 @@
           <a:p>
             <a:fld id="{9D7F7A4F-C86B-4E97-8396-79EF10BBD040}" type="slidenum">
               <a:rPr lang="en-GB" smtClean="0"/>
-              <a:t>‹N°›</a:t>
+              <a:t>‹#›</a:t>
             </a:fld>
             <a:endParaRPr lang="en-GB" dirty="0"/>
           </a:p>
@@ -1809,7 +1809,7 @@
           <a:p>
             <a:fld id="{1C2A38D2-D57A-4E64-B95F-0826012D069A}" type="datetimeFigureOut">
               <a:rPr lang="en-GB" smtClean="0"/>
-              <a:t>20/10/2021</a:t>
+              <a:t>21/10/2021</a:t>
             </a:fld>
             <a:endParaRPr lang="en-GB" dirty="0"/>
           </a:p>
@@ -1851,7 +1851,7 @@
           <a:p>
             <a:fld id="{9D7F7A4F-C86B-4E97-8396-79EF10BBD040}" type="slidenum">
               <a:rPr lang="en-GB" smtClean="0"/>
-              <a:t>‹N°›</a:t>
+              <a:t>‹#›</a:t>
             </a:fld>
             <a:endParaRPr lang="en-GB" dirty="0"/>
           </a:p>
@@ -1927,7 +1927,7 @@
           <a:p>
             <a:fld id="{1C2A38D2-D57A-4E64-B95F-0826012D069A}" type="datetimeFigureOut">
               <a:rPr lang="en-GB" smtClean="0"/>
-              <a:t>20/10/2021</a:t>
+              <a:t>21/10/2021</a:t>
             </a:fld>
             <a:endParaRPr lang="en-GB" dirty="0"/>
           </a:p>
@@ -1969,7 +1969,7 @@
           <a:p>
             <a:fld id="{9D7F7A4F-C86B-4E97-8396-79EF10BBD040}" type="slidenum">
               <a:rPr lang="en-GB" smtClean="0"/>
-              <a:t>‹N°›</a:t>
+              <a:t>‹#›</a:t>
             </a:fld>
             <a:endParaRPr lang="en-GB" dirty="0"/>
           </a:p>
@@ -2022,7 +2022,7 @@
           <a:p>
             <a:fld id="{1C2A38D2-D57A-4E64-B95F-0826012D069A}" type="datetimeFigureOut">
               <a:rPr lang="en-GB" smtClean="0"/>
-              <a:t>20/10/2021</a:t>
+              <a:t>21/10/2021</a:t>
             </a:fld>
             <a:endParaRPr lang="en-GB" dirty="0"/>
           </a:p>
@@ -2064,7 +2064,7 @@
           <a:p>
             <a:fld id="{9D7F7A4F-C86B-4E97-8396-79EF10BBD040}" type="slidenum">
               <a:rPr lang="en-GB" smtClean="0"/>
-              <a:t>‹N°›</a:t>
+              <a:t>‹#›</a:t>
             </a:fld>
             <a:endParaRPr lang="en-GB" dirty="0"/>
           </a:p>
@@ -2299,7 +2299,7 @@
           <a:p>
             <a:fld id="{1C2A38D2-D57A-4E64-B95F-0826012D069A}" type="datetimeFigureOut">
               <a:rPr lang="en-GB" smtClean="0"/>
-              <a:t>20/10/2021</a:t>
+              <a:t>21/10/2021</a:t>
             </a:fld>
             <a:endParaRPr lang="en-GB" dirty="0"/>
           </a:p>
@@ -2341,7 +2341,7 @@
           <a:p>
             <a:fld id="{9D7F7A4F-C86B-4E97-8396-79EF10BBD040}" type="slidenum">
               <a:rPr lang="en-GB" smtClean="0"/>
-              <a:t>‹N°›</a:t>
+              <a:t>‹#›</a:t>
             </a:fld>
             <a:endParaRPr lang="en-GB" dirty="0"/>
           </a:p>
@@ -2552,7 +2552,7 @@
           <a:p>
             <a:fld id="{1C2A38D2-D57A-4E64-B95F-0826012D069A}" type="datetimeFigureOut">
               <a:rPr lang="en-GB" smtClean="0"/>
-              <a:t>20/10/2021</a:t>
+              <a:t>21/10/2021</a:t>
             </a:fld>
             <a:endParaRPr lang="en-GB" dirty="0"/>
           </a:p>
@@ -2594,7 +2594,7 @@
           <a:p>
             <a:fld id="{9D7F7A4F-C86B-4E97-8396-79EF10BBD040}" type="slidenum">
               <a:rPr lang="en-GB" smtClean="0"/>
-              <a:t>‹N°›</a:t>
+              <a:t>‹#›</a:t>
             </a:fld>
             <a:endParaRPr lang="en-GB" dirty="0"/>
           </a:p>
@@ -2765,7 +2765,7 @@
           <a:p>
             <a:fld id="{1C2A38D2-D57A-4E64-B95F-0826012D069A}" type="datetimeFigureOut">
               <a:rPr lang="en-GB" smtClean="0"/>
-              <a:t>20/10/2021</a:t>
+              <a:t>21/10/2021</a:t>
             </a:fld>
             <a:endParaRPr lang="en-GB" dirty="0"/>
           </a:p>
@@ -2843,7 +2843,7 @@
           <a:p>
             <a:fld id="{9D7F7A4F-C86B-4E97-8396-79EF10BBD040}" type="slidenum">
               <a:rPr lang="en-GB" smtClean="0"/>
-              <a:t>‹N°›</a:t>
+              <a:t>‹#›</a:t>
             </a:fld>
             <a:endParaRPr lang="en-GB" dirty="0"/>
           </a:p>
@@ -4768,7 +4768,7 @@
             <a:p>
               <a:pPr algn="ctr"/>
               <a:r>
-                <a:rPr lang="en-GB" sz="2800" dirty="0" smtClean="0">
+                <a:rPr lang="en-GB" sz="2800" dirty="0">
                   <a:solidFill>
                     <a:schemeClr val="tx1"/>
                   </a:solidFill>
@@ -5366,7 +5366,7 @@
             <a:lstStyle/>
             <a:p>
               <a:r>
-                <a:rPr lang="en-GB" sz="2800" dirty="0" smtClean="0"/>
+                <a:rPr lang="en-GB" sz="2800" dirty="0"/>
                 <a:t>2</a:t>
               </a:r>
               <a:endParaRPr lang="en-GB" dirty="0"/>
@@ -5396,7 +5396,7 @@
             <a:lstStyle/>
             <a:p>
               <a:r>
-                <a:rPr lang="en-GB" sz="2800" dirty="0" smtClean="0"/>
+                <a:rPr lang="en-GB" sz="2800" dirty="0"/>
                 <a:t>2</a:t>
               </a:r>
               <a:endParaRPr lang="en-GB" dirty="0"/>
@@ -5953,10 +5953,9 @@
           <a:lstStyle/>
           <a:p>
             <a:r>
-              <a:rPr lang="en-GB" sz="2400" dirty="0" smtClean="0"/>
+              <a:rPr lang="en-GB" sz="2400" dirty="0"/>
               <a:t>3</a:t>
             </a:r>
-            <a:endParaRPr lang="en-GB" sz="2400" dirty="0"/>
           </a:p>
         </p:txBody>
       </p:sp>
@@ -5983,10 +5982,9 @@
           <a:lstStyle/>
           <a:p>
             <a:r>
-              <a:rPr lang="en-GB" sz="2400" dirty="0" smtClean="0"/>
+              <a:rPr lang="en-GB" sz="2400" dirty="0"/>
               <a:t>3</a:t>
             </a:r>
-            <a:endParaRPr lang="en-GB" sz="2400" dirty="0"/>
           </a:p>
         </p:txBody>
       </p:sp>
@@ -6568,10 +6566,9 @@
           <a:lstStyle/>
           <a:p>
             <a:r>
-              <a:rPr lang="en-GB" sz="2800" dirty="0" smtClean="0"/>
+              <a:rPr lang="en-GB" sz="2800" dirty="0"/>
               <a:t>4</a:t>
             </a:r>
-            <a:endParaRPr lang="en-GB" sz="2800" dirty="0"/>
           </a:p>
         </p:txBody>
       </p:sp>
@@ -7124,10 +7121,9 @@
           <a:lstStyle/>
           <a:p>
             <a:r>
-              <a:rPr lang="en-GB" sz="2800" dirty="0" smtClean="0"/>
+              <a:rPr lang="en-GB" sz="2800" dirty="0"/>
               <a:t>5</a:t>
             </a:r>
-            <a:endParaRPr lang="en-GB" sz="2800" dirty="0"/>
           </a:p>
         </p:txBody>
       </p:sp>
@@ -7154,10 +7150,9 @@
           <a:lstStyle/>
           <a:p>
             <a:r>
-              <a:rPr lang="en-GB" sz="2800" dirty="0" smtClean="0"/>
+              <a:rPr lang="en-GB" sz="2800" dirty="0"/>
               <a:t>5</a:t>
             </a:r>
-            <a:endParaRPr lang="en-GB" sz="2800" dirty="0"/>
           </a:p>
         </p:txBody>
       </p:sp>
@@ -7710,10 +7705,9 @@
           <a:lstStyle/>
           <a:p>
             <a:r>
-              <a:rPr lang="en-GB" sz="2800" dirty="0" smtClean="0"/>
+              <a:rPr lang="en-GB" sz="2800" dirty="0"/>
               <a:t>6</a:t>
             </a:r>
-            <a:endParaRPr lang="en-GB" sz="2800" dirty="0"/>
           </a:p>
         </p:txBody>
       </p:sp>
@@ -7740,7 +7734,7 @@
           <a:lstStyle/>
           <a:p>
             <a:r>
-              <a:rPr lang="en-GB" sz="2800" dirty="0" smtClean="0"/>
+              <a:rPr lang="en-GB" sz="2800" dirty="0"/>
               <a:t>6</a:t>
             </a:r>
             <a:endParaRPr lang="en-GB" dirty="0"/>
@@ -7785,8 +7779,8 @@
         </p:nvSpPr>
         <p:spPr>
           <a:xfrm>
-            <a:off x="1874196" y="1536174"/>
-            <a:ext cx="8443609" cy="3785652"/>
+            <a:off x="1874196" y="1720840"/>
+            <a:ext cx="8443609" cy="3416320"/>
           </a:xfrm>
           <a:prstGeom prst="rect">
             <a:avLst/>
@@ -7843,10 +7837,6 @@
               <a:rPr lang="fr-FR" sz="2400" dirty="0"/>
               <a:t>En résumé, vous allez effectuer une série d’exercices de mémoire. Ces exercices seront plus ou moins difficiles. Pour chacun d’entre eux, nous vous demanderons d’auto-évaluer votre performance.</a:t>
             </a:r>
-          </a:p>
-          <a:p>
-            <a:pPr algn="ctr"/>
-            <a:endParaRPr lang="en-GB" sz="2400" dirty="0"/>
           </a:p>
         </p:txBody>
       </p:sp>
@@ -8399,7 +8389,7 @@
           <a:lstStyle/>
           <a:p>
             <a:r>
-              <a:rPr lang="en-GB" sz="2800" dirty="0" smtClean="0"/>
+              <a:rPr lang="en-GB" sz="2800" dirty="0"/>
               <a:t>7</a:t>
             </a:r>
             <a:endParaRPr lang="en-GB" dirty="0"/>
@@ -8429,7 +8419,7 @@
           <a:lstStyle/>
           <a:p>
             <a:r>
-              <a:rPr lang="en-GB" sz="2800" dirty="0" smtClean="0"/>
+              <a:rPr lang="en-GB" sz="2800" dirty="0"/>
               <a:t>7</a:t>
             </a:r>
             <a:endParaRPr lang="en-GB" dirty="0"/>
@@ -8985,7 +8975,7 @@
           <a:lstStyle/>
           <a:p>
             <a:r>
-              <a:rPr lang="en-GB" sz="2800" dirty="0" smtClean="0"/>
+              <a:rPr lang="en-GB" sz="2800" dirty="0"/>
               <a:t>8</a:t>
             </a:r>
             <a:endParaRPr lang="en-GB" dirty="0"/>
@@ -9015,7 +9005,7 @@
           <a:lstStyle/>
           <a:p>
             <a:r>
-              <a:rPr lang="en-GB" sz="2800" dirty="0" smtClean="0"/>
+              <a:rPr lang="en-GB" sz="2800" dirty="0"/>
               <a:t>8</a:t>
             </a:r>
             <a:endParaRPr lang="en-GB" dirty="0"/>
@@ -10141,7 +10131,7 @@
               <a:p>
                 <a:pPr algn="ctr"/>
                 <a:r>
-                  <a:rPr lang="en-GB" sz="2800" dirty="0" smtClean="0">
+                  <a:rPr lang="en-GB" sz="2800" dirty="0">
                     <a:solidFill>
                       <a:schemeClr val="tx1"/>
                     </a:solidFill>
@@ -11477,7 +11467,7 @@
           <a:lstStyle/>
           <a:p>
             <a:r>
-              <a:rPr lang="en-GB" sz="2800" dirty="0" smtClean="0"/>
+              <a:rPr lang="en-GB" sz="2800" dirty="0"/>
               <a:t>1</a:t>
             </a:r>
             <a:endParaRPr lang="en-GB" dirty="0"/>
@@ -11555,7 +11545,7 @@
           <a:lstStyle/>
           <a:p>
             <a:r>
-              <a:rPr lang="en-GB" sz="2800" dirty="0" smtClean="0"/>
+              <a:rPr lang="en-GB" sz="2800" dirty="0"/>
               <a:t>1</a:t>
             </a:r>
             <a:endParaRPr lang="en-GB" dirty="0"/>
@@ -11928,7 +11918,7 @@
           <a:lstStyle/>
           <a:p>
             <a:r>
-              <a:rPr lang="en-GB" sz="2800" dirty="0" smtClean="0"/>
+              <a:rPr lang="en-GB" sz="2800" dirty="0"/>
               <a:t>1</a:t>
             </a:r>
             <a:endParaRPr lang="en-GB" dirty="0"/>
@@ -12006,7 +11996,7 @@
           <a:lstStyle/>
           <a:p>
             <a:r>
-              <a:rPr lang="en-GB" sz="2800" dirty="0" smtClean="0"/>
+              <a:rPr lang="en-GB" sz="2800" dirty="0"/>
               <a:t>1</a:t>
             </a:r>
             <a:endParaRPr lang="en-GB" dirty="0"/>
@@ -12420,7 +12410,7 @@
             <a:p>
               <a:pPr algn="ctr"/>
               <a:r>
-                <a:rPr lang="en-GB" sz="2800" dirty="0" smtClean="0">
+                <a:rPr lang="en-GB" sz="2800" dirty="0">
                   <a:solidFill>
                     <a:schemeClr val="tx1"/>
                   </a:solidFill>
@@ -12910,10 +12900,9 @@
           <a:lstStyle/>
           <a:p>
             <a:r>
-              <a:rPr lang="en-GB" sz="2800" dirty="0" smtClean="0"/>
+              <a:rPr lang="en-GB" sz="2800" dirty="0"/>
               <a:t>8</a:t>
             </a:r>
-            <a:endParaRPr lang="en-GB" sz="2800" dirty="0"/>
           </a:p>
         </p:txBody>
       </p:sp>
@@ -12940,10 +12929,9 @@
           <a:lstStyle/>
           <a:p>
             <a:r>
-              <a:rPr lang="en-GB" sz="2800" dirty="0" smtClean="0"/>
+              <a:rPr lang="en-GB" sz="2800" dirty="0"/>
               <a:t>8</a:t>
             </a:r>
-            <a:endParaRPr lang="en-GB" sz="2800" dirty="0"/>
           </a:p>
         </p:txBody>
       </p:sp>
@@ -14189,7 +14177,7 @@
             </a:pPr>
             <a:r>
               <a:rPr lang="fr-FR" sz="2400" dirty="0"/>
-              <a:t>Nous vous montrerons la grille une fois et puis vous demanderons d’imaginer combien d’effort cela vous demanderait pour atteindre différents scores.</a:t>
+              <a:t>Nous vous montrerons la grille une fois et puis nous vous demanderons d’imaginer combien d’effort cela vous demanderait pour atteindre différents scores.</a:t>
             </a:r>
           </a:p>
           <a:p>

</xml_diff>